<commit_message>
Add advanced event callback sample.
</commit_message>
<xml_diff>
--- a/Slides/7 Callbacks and Customization/Callbacks and Customization.pptx
+++ b/Slides/7 Callbacks and Customization/Callbacks and Customization.pptx
@@ -24,9 +24,9 @@
     <p:sldId id="272" r:id="rId18"/>
     <p:sldId id="273" r:id="rId19"/>
     <p:sldId id="275" r:id="rId20"/>
-    <p:sldId id="276" r:id="rId21"/>
-    <p:sldId id="277" r:id="rId22"/>
-    <p:sldId id="274" r:id="rId23"/>
+    <p:sldId id="278" r:id="rId21"/>
+    <p:sldId id="276" r:id="rId22"/>
+    <p:sldId id="277" r:id="rId23"/>
   </p:sldIdLst>
   <p:sldSz cx="9144000" cy="5143500" type="screen16x9"/>
   <p:notesSz cx="6858000" cy="9144000"/>
@@ -348,7 +348,7 @@
           <a:p>
             <a:fld id="{530820CF-B880-4189-942D-D702A7CBA730}" type="datetimeFigureOut">
               <a:rPr lang="zh-CN" altLang="en-US" smtClean="0"/>
-              <a:t>2017/10/19</a:t>
+              <a:t>2017/10/25</a:t>
             </a:fld>
             <a:endParaRPr lang="zh-CN" altLang="en-US"/>
           </a:p>
@@ -570,7 +570,7 @@
           <a:p>
             <a:fld id="{530820CF-B880-4189-942D-D702A7CBA730}" type="datetimeFigureOut">
               <a:rPr lang="zh-CN" altLang="en-US" smtClean="0"/>
-              <a:t>2017/10/19</a:t>
+              <a:t>2017/10/25</a:t>
             </a:fld>
             <a:endParaRPr lang="zh-CN" altLang="en-US"/>
           </a:p>
@@ -838,7 +838,7 @@
           <a:p>
             <a:fld id="{530820CF-B880-4189-942D-D702A7CBA730}" type="datetimeFigureOut">
               <a:rPr lang="zh-CN" altLang="en-US" smtClean="0"/>
-              <a:t>2017/10/19</a:t>
+              <a:t>2017/10/25</a:t>
             </a:fld>
             <a:endParaRPr lang="zh-CN" altLang="en-US"/>
           </a:p>
@@ -1088,7 +1088,7 @@
           <a:p>
             <a:fld id="{530820CF-B880-4189-942D-D702A7CBA730}" type="datetimeFigureOut">
               <a:rPr lang="zh-CN" altLang="en-US" smtClean="0"/>
-              <a:t>2017/10/19</a:t>
+              <a:t>2017/10/25</a:t>
             </a:fld>
             <a:endParaRPr lang="zh-CN" altLang="en-US"/>
           </a:p>
@@ -1347,7 +1347,7 @@
           <a:p>
             <a:fld id="{530820CF-B880-4189-942D-D702A7CBA730}" type="datetimeFigureOut">
               <a:rPr lang="zh-CN" altLang="en-US" smtClean="0"/>
-              <a:t>2017/10/19</a:t>
+              <a:t>2017/10/25</a:t>
             </a:fld>
             <a:endParaRPr lang="zh-CN" altLang="en-US"/>
           </a:p>
@@ -1712,7 +1712,7 @@
           <a:p>
             <a:fld id="{530820CF-B880-4189-942D-D702A7CBA730}" type="datetimeFigureOut">
               <a:rPr lang="zh-CN" altLang="en-US" smtClean="0"/>
-              <a:t>2017/10/19</a:t>
+              <a:t>2017/10/25</a:t>
             </a:fld>
             <a:endParaRPr lang="zh-CN" altLang="en-US"/>
           </a:p>
@@ -2210,7 +2210,7 @@
           <a:p>
             <a:fld id="{530820CF-B880-4189-942D-D702A7CBA730}" type="datetimeFigureOut">
               <a:rPr lang="zh-CN" altLang="en-US" smtClean="0"/>
-              <a:t>2017/10/19</a:t>
+              <a:t>2017/10/25</a:t>
             </a:fld>
             <a:endParaRPr lang="zh-CN" altLang="en-US"/>
           </a:p>
@@ -2404,7 +2404,7 @@
           <a:p>
             <a:fld id="{530820CF-B880-4189-942D-D702A7CBA730}" type="datetimeFigureOut">
               <a:rPr lang="zh-CN" altLang="en-US" smtClean="0"/>
-              <a:t>2017/10/19</a:t>
+              <a:t>2017/10/25</a:t>
             </a:fld>
             <a:endParaRPr lang="zh-CN" altLang="en-US"/>
           </a:p>
@@ -2575,7 +2575,7 @@
           <a:p>
             <a:fld id="{530820CF-B880-4189-942D-D702A7CBA730}" type="datetimeFigureOut">
               <a:rPr lang="zh-CN" altLang="en-US" smtClean="0"/>
-              <a:t>2017/10/19</a:t>
+              <a:t>2017/10/25</a:t>
             </a:fld>
             <a:endParaRPr lang="zh-CN" altLang="en-US"/>
           </a:p>
@@ -2975,7 +2975,7 @@
           <a:p>
             <a:fld id="{530820CF-B880-4189-942D-D702A7CBA730}" type="datetimeFigureOut">
               <a:rPr lang="zh-CN" altLang="en-US" smtClean="0"/>
-              <a:t>2017/10/19</a:t>
+              <a:t>2017/10/25</a:t>
             </a:fld>
             <a:endParaRPr lang="zh-CN" altLang="en-US"/>
           </a:p>
@@ -3355,7 +3355,7 @@
           <a:p>
             <a:fld id="{530820CF-B880-4189-942D-D702A7CBA730}" type="datetimeFigureOut">
               <a:rPr lang="zh-CN" altLang="en-US" smtClean="0"/>
-              <a:t>2017/10/19</a:t>
+              <a:t>2017/10/25</a:t>
             </a:fld>
             <a:endParaRPr lang="zh-CN" altLang="en-US"/>
           </a:p>
@@ -3629,7 +3629,7 @@
           <a:p>
             <a:fld id="{530820CF-B880-4189-942D-D702A7CBA730}" type="datetimeFigureOut">
               <a:rPr lang="zh-CN" altLang="en-US" smtClean="0"/>
-              <a:t>2017/10/19</a:t>
+              <a:t>2017/10/25</a:t>
             </a:fld>
             <a:endParaRPr lang="zh-CN" altLang="en-US"/>
           </a:p>
@@ -5568,8 +5568,6 @@
               <a:rPr lang="en-US" altLang="zh-CN" dirty="0" smtClean="0"/>
               <a:t>:</a:t>
             </a:r>
-          </a:p>
-          <a:p>
             <a:endParaRPr lang="en-US" altLang="zh-CN" dirty="0"/>
           </a:p>
           <a:p>
@@ -5689,7 +5687,7 @@
         </p:blipFill>
         <p:spPr bwMode="auto">
           <a:xfrm>
-            <a:off x="1835696" y="4443958"/>
+            <a:off x="1619672" y="3867894"/>
             <a:ext cx="6210300" cy="736997"/>
           </a:xfrm>
           <a:prstGeom prst="rect">
@@ -6061,8 +6059,12 @@
           <a:lstStyle/>
           <a:p>
             <a:r>
-              <a:rPr lang="en-US" altLang="zh-CN" dirty="0"/>
-              <a:t>Active Transforms</a:t>
+              <a:rPr lang="zh-CN" altLang="en-US" dirty="0" smtClean="0"/>
+              <a:t>使用</a:t>
+            </a:r>
+            <a:r>
+              <a:rPr lang="en-US" altLang="zh-CN" dirty="0" smtClean="0"/>
+              <a:t>contact modification</a:t>
             </a:r>
             <a:endParaRPr lang="zh-CN" altLang="en-US" dirty="0"/>
           </a:p>
@@ -6087,37 +6089,59 @@
           <a:p>
             <a:r>
               <a:rPr lang="en-US" altLang="zh-CN" dirty="0"/>
-              <a:t>The active transforms API provides an efficient way to reflect actor transform changes in a PhysX scene to an associated external object such as a render mesh.</a:t>
-            </a:r>
-          </a:p>
-          <a:p>
-            <a:r>
-              <a:rPr lang="en-US" altLang="zh-CN" dirty="0"/>
-              <a:t>When a scene's </a:t>
-            </a:r>
-            <a:r>
-              <a:rPr lang="en-US" altLang="zh-CN" dirty="0" err="1"/>
-              <a:t>fetchResults</a:t>
-            </a:r>
-            <a:r>
-              <a:rPr lang="en-US" altLang="zh-CN" dirty="0"/>
-              <a:t>() method is called an array of </a:t>
-            </a:r>
-            <a:r>
-              <a:rPr lang="en-US" altLang="zh-CN" i="1" dirty="0" err="1"/>
-              <a:t>PxActiveTransform</a:t>
-            </a:r>
-            <a:r>
-              <a:rPr lang="en-US" altLang="zh-CN" dirty="0"/>
-              <a:t> </a:t>
-            </a:r>
-            <a:r>
-              <a:rPr lang="en-US" altLang="zh-CN" dirty="0" err="1"/>
-              <a:t>structs</a:t>
-            </a:r>
-            <a:r>
-              <a:rPr lang="en-US" altLang="zh-CN" dirty="0"/>
-              <a:t> is generated, each entry in the array contains a pointer to the actor that moved, its user data and its new transform. Because only actors that have moved will be included in the list this approach is potentially much more efficient than, for example, analyzing each actor in the scene individually.</a:t>
+              <a:t>Every pair of shapes comes with an array of contact points, that have a number of properties that can be </a:t>
+            </a:r>
+            <a:r>
+              <a:rPr lang="en-US" altLang="zh-CN" dirty="0" smtClean="0"/>
+              <a:t>modified</a:t>
+            </a:r>
+          </a:p>
+          <a:p>
+            <a:pPr lvl="1"/>
+            <a:r>
+              <a:rPr lang="en-US" altLang="zh-CN" dirty="0" smtClean="0"/>
+              <a:t>such </a:t>
+            </a:r>
+            <a:r>
+              <a:rPr lang="en-US" altLang="zh-CN" dirty="0"/>
+              <a:t>as position, contact normal, and </a:t>
+            </a:r>
+            <a:r>
+              <a:rPr lang="en-US" altLang="zh-CN" dirty="0" smtClean="0"/>
+              <a:t>separation</a:t>
+            </a:r>
+            <a:endParaRPr lang="en-US" altLang="zh-CN" dirty="0"/>
+          </a:p>
+          <a:p>
+            <a:r>
+              <a:rPr lang="en-US" altLang="zh-CN" dirty="0"/>
+              <a:t>In addition to modifying contact properties, it is possible to: </a:t>
+            </a:r>
+            <a:endParaRPr lang="en-US" altLang="zh-CN" dirty="0" smtClean="0"/>
+          </a:p>
+          <a:p>
+            <a:pPr lvl="1"/>
+            <a:r>
+              <a:rPr lang="en-US" altLang="zh-CN" dirty="0" smtClean="0"/>
+              <a:t>Set </a:t>
+            </a:r>
+            <a:r>
+              <a:rPr lang="en-US" altLang="zh-CN" dirty="0"/>
+              <a:t>target velocities for each contact </a:t>
+            </a:r>
+          </a:p>
+          <a:p>
+            <a:pPr lvl="1"/>
+            <a:r>
+              <a:rPr lang="en-US" altLang="zh-CN" dirty="0"/>
+              <a:t>Limit the maximum impulse applied at each contact </a:t>
+            </a:r>
+          </a:p>
+          <a:p>
+            <a:pPr lvl="1"/>
+            <a:r>
+              <a:rPr lang="en-US" altLang="zh-CN" dirty="0"/>
+              <a:t>Adjust inverse mass and inverse inertia scales separately for each body </a:t>
             </a:r>
           </a:p>
           <a:p>
@@ -6128,20 +6152,13 @@
     </p:spTree>
     <p:extLst>
       <p:ext uri="{BB962C8B-B14F-4D97-AF65-F5344CB8AC3E}">
-        <p14:creationId xmlns:p14="http://schemas.microsoft.com/office/powerpoint/2010/main" val="1696910163"/>
+        <p14:creationId xmlns:p14="http://schemas.microsoft.com/office/powerpoint/2010/main" val="1826273042"/>
       </p:ext>
     </p:extLst>
   </p:cSld>
   <p:clrMapOvr>
     <a:masterClrMapping/>
   </p:clrMapOvr>
-  <p:timing>
-    <p:tnLst>
-      <p:par>
-        <p:cTn id="1" dur="indefinite" restart="never" nodeType="tmRoot"/>
-      </p:par>
-    </p:tnLst>
-  </p:timing>
 </p:sld>
 </file>
 
@@ -6177,7 +6194,11 @@
           <a:bodyPr/>
           <a:lstStyle/>
           <a:p>
-            <a:endParaRPr lang="zh-CN" altLang="en-US"/>
+            <a:r>
+              <a:rPr lang="en-US" altLang="zh-CN" b="1" dirty="0"/>
+              <a:t>Active Actors</a:t>
+            </a:r>
+            <a:endParaRPr lang="zh-CN" altLang="en-US" dirty="0"/>
           </a:p>
         </p:txBody>
       </p:sp>
@@ -6193,87 +6214,49 @@
         </p:nvSpPr>
         <p:spPr/>
         <p:txBody>
-          <a:bodyPr/>
-          <a:lstStyle/>
-          <a:p>
-            <a:r>
-              <a:rPr lang="en-US" altLang="zh-CN" dirty="0"/>
-              <a:t>The example below shows how to use active transforms to update a render object:</a:t>
-            </a:r>
-          </a:p>
-          <a:p>
+          <a:bodyPr>
+            <a:normAutofit fontScale="85000" lnSpcReduction="10000"/>
+          </a:bodyPr>
+          <a:lstStyle/>
+          <a:p>
+            <a:r>
+              <a:rPr lang="en-US" altLang="zh-CN" dirty="0"/>
+              <a:t>The active actors API provides an efficient way to reflect actor transform changes in a PhysX scene to an associated external object such as a render mesh.</a:t>
+            </a:r>
+          </a:p>
+          <a:p>
+            <a:r>
+              <a:rPr lang="en-US" altLang="zh-CN" dirty="0"/>
+              <a:t>When a scene's </a:t>
+            </a:r>
+            <a:r>
+              <a:rPr lang="en-US" altLang="zh-CN" dirty="0" err="1"/>
+              <a:t>fetchResults</a:t>
+            </a:r>
+            <a:r>
+              <a:rPr lang="en-US" altLang="zh-CN" dirty="0"/>
+              <a:t>() method is called an array of active </a:t>
+            </a:r>
+            <a:r>
+              <a:rPr lang="en-US" altLang="zh-CN" i="1" dirty="0" err="1"/>
+              <a:t>PxActor</a:t>
+            </a:r>
+            <a:r>
+              <a:rPr lang="en-US" altLang="zh-CN" dirty="0"/>
+              <a:t> is generated. Because only actors that have moved will be included in the list this approach is potentially much more efficient than, for example, analyzing each actor in the scene </a:t>
+            </a:r>
+            <a:r>
+              <a:rPr lang="en-US" altLang="zh-CN" dirty="0" smtClean="0"/>
+              <a:t>individually</a:t>
+            </a:r>
             <a:endParaRPr lang="zh-CN" altLang="en-US" dirty="0"/>
           </a:p>
         </p:txBody>
       </p:sp>
-      <p:pic>
-        <p:nvPicPr>
-          <p:cNvPr id="8194" name="Picture 2"/>
-          <p:cNvPicPr>
-            <a:picLocks noChangeAspect="1" noChangeArrowheads="1"/>
-          </p:cNvPicPr>
-          <p:nvPr/>
-        </p:nvPicPr>
-        <p:blipFill>
-          <a:blip r:embed="rId2">
-            <a:extLst>
-              <a:ext uri="{28A0092B-C50C-407E-A947-70E740481C1C}">
-                <a14:useLocalDpi xmlns:a14="http://schemas.microsoft.com/office/drawing/2010/main" val="0"/>
-              </a:ext>
-            </a:extLst>
-          </a:blip>
-          <a:srcRect/>
-          <a:stretch>
-            <a:fillRect/>
-          </a:stretch>
-        </p:blipFill>
-        <p:spPr bwMode="auto">
-          <a:xfrm>
-            <a:off x="1123950" y="2475291"/>
-            <a:ext cx="6896100" cy="1446610"/>
-          </a:xfrm>
-          <a:prstGeom prst="rect">
-            <a:avLst/>
-          </a:prstGeom>
-          <a:noFill/>
-          <a:ln>
-            <a:noFill/>
-          </a:ln>
-          <a:effectLst/>
-          <a:extLst>
-            <a:ext uri="{909E8E84-426E-40DD-AFC4-6F175D3DCCD1}">
-              <a14:hiddenFill xmlns:a14="http://schemas.microsoft.com/office/drawing/2010/main">
-                <a:solidFill>
-                  <a:schemeClr val="accent1"/>
-                </a:solidFill>
-              </a14:hiddenFill>
-            </a:ext>
-            <a:ext uri="{91240B29-F687-4F45-9708-019B960494DF}">
-              <a14:hiddenLine xmlns:a14="http://schemas.microsoft.com/office/drawing/2010/main" w="9525">
-                <a:solidFill>
-                  <a:schemeClr val="tx1"/>
-                </a:solidFill>
-                <a:miter lim="800000"/>
-                <a:headEnd/>
-                <a:tailEnd/>
-              </a14:hiddenLine>
-            </a:ext>
-            <a:ext uri="{AF507438-7753-43E0-B8FC-AC1667EBCBE1}">
-              <a14:hiddenEffects xmlns:a14="http://schemas.microsoft.com/office/drawing/2010/main">
-                <a:effectLst>
-                  <a:outerShdw dist="35921" dir="2700000" algn="ctr" rotWithShape="0">
-                    <a:schemeClr val="bg2"/>
-                  </a:outerShdw>
-                </a:effectLst>
-              </a14:hiddenEffects>
-            </a:ext>
-          </a:extLst>
-        </p:spPr>
-      </p:pic>
     </p:spTree>
     <p:extLst>
       <p:ext uri="{BB962C8B-B14F-4D97-AF65-F5344CB8AC3E}">
-        <p14:creationId xmlns:p14="http://schemas.microsoft.com/office/powerpoint/2010/main" val="1529980378"/>
+        <p14:creationId xmlns:p14="http://schemas.microsoft.com/office/powerpoint/2010/main" val="1696910163"/>
       </p:ext>
     </p:extLst>
   </p:cSld>
@@ -6341,14 +6324,294 @@
           <a:bodyPr/>
           <a:lstStyle/>
           <a:p>
-            <a:endParaRPr lang="zh-CN" altLang="en-US"/>
+            <a:endParaRPr lang="zh-CN" altLang="en-US" dirty="0"/>
+          </a:p>
+        </p:txBody>
+      </p:sp>
+      <p:sp>
+        <p:nvSpPr>
+          <p:cNvPr id="5" name="矩形 4"/>
+          <p:cNvSpPr/>
+          <p:nvPr/>
+        </p:nvSpPr>
+        <p:spPr>
+          <a:xfrm>
+            <a:off x="251520" y="555526"/>
+            <a:ext cx="8856984" cy="3970318"/>
+          </a:xfrm>
+          <a:prstGeom prst="rect">
+            <a:avLst/>
+          </a:prstGeom>
+        </p:spPr>
+        <p:txBody>
+          <a:bodyPr wrap="square">
+            <a:spAutoFit/>
+          </a:bodyPr>
+          <a:lstStyle/>
+          <a:p>
+            <a:r>
+              <a:rPr lang="en-US" altLang="zh-CN" dirty="0"/>
+              <a:t>// update scene</a:t>
+            </a:r>
+          </a:p>
+          <a:p>
+            <a:r>
+              <a:rPr lang="en-US" altLang="zh-CN" dirty="0" err="1"/>
+              <a:t>scene.simulate</a:t>
+            </a:r>
+            <a:r>
+              <a:rPr lang="en-US" altLang="zh-CN" dirty="0"/>
+              <a:t>(</a:t>
+            </a:r>
+            <a:r>
+              <a:rPr lang="en-US" altLang="zh-CN" dirty="0" err="1"/>
+              <a:t>dt</a:t>
+            </a:r>
+            <a:r>
+              <a:rPr lang="en-US" altLang="zh-CN" dirty="0"/>
+              <a:t>);</a:t>
+            </a:r>
+          </a:p>
+          <a:p>
+            <a:r>
+              <a:rPr lang="en-US" altLang="zh-CN" dirty="0" err="1"/>
+              <a:t>scene.fetchResults</a:t>
+            </a:r>
+            <a:r>
+              <a:rPr lang="en-US" altLang="zh-CN" dirty="0"/>
+              <a:t>();</a:t>
+            </a:r>
+          </a:p>
+          <a:p>
+            <a:endParaRPr lang="en-US" altLang="zh-CN" dirty="0"/>
+          </a:p>
+          <a:p>
+            <a:r>
+              <a:rPr lang="en-US" altLang="zh-CN" dirty="0"/>
+              <a:t>// retrieve array of actors that moved</a:t>
+            </a:r>
+          </a:p>
+          <a:p>
+            <a:r>
+              <a:rPr lang="en-US" altLang="zh-CN" dirty="0"/>
+              <a:t>PxU32 </a:t>
+            </a:r>
+            <a:r>
+              <a:rPr lang="en-US" altLang="zh-CN" dirty="0" err="1"/>
+              <a:t>nbActiveActors</a:t>
+            </a:r>
+            <a:r>
+              <a:rPr lang="en-US" altLang="zh-CN" dirty="0"/>
+              <a:t>;</a:t>
+            </a:r>
+          </a:p>
+          <a:p>
+            <a:r>
+              <a:rPr lang="en-US" altLang="zh-CN" dirty="0" err="1"/>
+              <a:t>PxActor</a:t>
+            </a:r>
+            <a:r>
+              <a:rPr lang="en-US" altLang="zh-CN" dirty="0"/>
+              <a:t>** </a:t>
+            </a:r>
+            <a:r>
+              <a:rPr lang="en-US" altLang="zh-CN" dirty="0" err="1"/>
+              <a:t>activeActors</a:t>
+            </a:r>
+            <a:r>
+              <a:rPr lang="en-US" altLang="zh-CN" dirty="0"/>
+              <a:t> = </a:t>
+            </a:r>
+            <a:r>
+              <a:rPr lang="en-US" altLang="zh-CN" dirty="0" err="1"/>
+              <a:t>scene.getActiveActors</a:t>
+            </a:r>
+            <a:r>
+              <a:rPr lang="en-US" altLang="zh-CN" dirty="0"/>
+              <a:t>(</a:t>
+            </a:r>
+            <a:r>
+              <a:rPr lang="en-US" altLang="zh-CN" dirty="0" err="1"/>
+              <a:t>nbActiveActors</a:t>
+            </a:r>
+            <a:r>
+              <a:rPr lang="en-US" altLang="zh-CN" dirty="0"/>
+              <a:t>);</a:t>
+            </a:r>
+          </a:p>
+          <a:p>
+            <a:endParaRPr lang="en-US" altLang="zh-CN" dirty="0"/>
+          </a:p>
+          <a:p>
+            <a:r>
+              <a:rPr lang="en-US" altLang="zh-CN" dirty="0"/>
+              <a:t>// update each render object with the new transform</a:t>
+            </a:r>
+          </a:p>
+          <a:p>
+            <a:r>
+              <a:rPr lang="en-US" altLang="zh-CN" dirty="0"/>
+              <a:t>for (PxU32 </a:t>
+            </a:r>
+            <a:r>
+              <a:rPr lang="en-US" altLang="zh-CN" dirty="0" err="1"/>
+              <a:t>i</a:t>
+            </a:r>
+            <a:r>
+              <a:rPr lang="en-US" altLang="zh-CN" dirty="0"/>
+              <a:t>=0; </a:t>
+            </a:r>
+            <a:r>
+              <a:rPr lang="en-US" altLang="zh-CN" dirty="0" err="1"/>
+              <a:t>i</a:t>
+            </a:r>
+            <a:r>
+              <a:rPr lang="en-US" altLang="zh-CN" dirty="0"/>
+              <a:t> &lt; </a:t>
+            </a:r>
+            <a:r>
+              <a:rPr lang="en-US" altLang="zh-CN" dirty="0" err="1"/>
+              <a:t>nbActiveActors</a:t>
+            </a:r>
+            <a:r>
+              <a:rPr lang="en-US" altLang="zh-CN" dirty="0"/>
+              <a:t>; ++</a:t>
+            </a:r>
+            <a:r>
+              <a:rPr lang="en-US" altLang="zh-CN" dirty="0" err="1"/>
+              <a:t>i</a:t>
+            </a:r>
+            <a:r>
+              <a:rPr lang="en-US" altLang="zh-CN" dirty="0"/>
+              <a:t>)</a:t>
+            </a:r>
+          </a:p>
+          <a:p>
+            <a:r>
+              <a:rPr lang="en-US" altLang="zh-CN" dirty="0"/>
+              <a:t>{</a:t>
+            </a:r>
+          </a:p>
+          <a:p>
+            <a:r>
+              <a:rPr lang="en-US" altLang="zh-CN" dirty="0"/>
+              <a:t>    </a:t>
+            </a:r>
+            <a:r>
+              <a:rPr lang="en-US" altLang="zh-CN" dirty="0" err="1"/>
+              <a:t>MyRenderObject</a:t>
+            </a:r>
+            <a:r>
+              <a:rPr lang="en-US" altLang="zh-CN" dirty="0"/>
+              <a:t>* </a:t>
+            </a:r>
+            <a:r>
+              <a:rPr lang="en-US" altLang="zh-CN" dirty="0" err="1"/>
+              <a:t>renderObject</a:t>
+            </a:r>
+            <a:r>
+              <a:rPr lang="en-US" altLang="zh-CN" dirty="0"/>
+              <a:t> = </a:t>
+            </a:r>
+            <a:r>
+              <a:rPr lang="en-US" altLang="zh-CN" dirty="0" err="1"/>
+              <a:t>static_cast</a:t>
+            </a:r>
+            <a:r>
+              <a:rPr lang="en-US" altLang="zh-CN" dirty="0"/>
+              <a:t>&lt;</a:t>
+            </a:r>
+            <a:r>
+              <a:rPr lang="en-US" altLang="zh-CN" dirty="0" err="1"/>
+              <a:t>MyRenderObject</a:t>
+            </a:r>
+            <a:r>
+              <a:rPr lang="en-US" altLang="zh-CN" dirty="0"/>
+              <a:t>*&gt;(</a:t>
+            </a:r>
+            <a:r>
+              <a:rPr lang="en-US" altLang="zh-CN" dirty="0" err="1"/>
+              <a:t>activeActors</a:t>
+            </a:r>
+            <a:r>
+              <a:rPr lang="en-US" altLang="zh-CN" dirty="0"/>
+              <a:t>[</a:t>
+            </a:r>
+            <a:r>
+              <a:rPr lang="en-US" altLang="zh-CN" dirty="0" err="1"/>
+              <a:t>i</a:t>
+            </a:r>
+            <a:r>
+              <a:rPr lang="en-US" altLang="zh-CN" dirty="0"/>
+              <a:t>]-&gt;</a:t>
+            </a:r>
+            <a:r>
+              <a:rPr lang="en-US" altLang="zh-CN" dirty="0" err="1"/>
+              <a:t>userData</a:t>
+            </a:r>
+            <a:r>
+              <a:rPr lang="en-US" altLang="zh-CN" dirty="0"/>
+              <a:t>);</a:t>
+            </a:r>
+          </a:p>
+          <a:p>
+            <a:r>
+              <a:rPr lang="en-US" altLang="zh-CN" dirty="0"/>
+              <a:t>    </a:t>
+            </a:r>
+            <a:r>
+              <a:rPr lang="en-US" altLang="zh-CN" dirty="0" err="1"/>
+              <a:t>renderObject</a:t>
+            </a:r>
+            <a:r>
+              <a:rPr lang="en-US" altLang="zh-CN" dirty="0"/>
+              <a:t>-&gt;</a:t>
+            </a:r>
+            <a:r>
+              <a:rPr lang="en-US" altLang="zh-CN" dirty="0" err="1"/>
+              <a:t>setTransform</a:t>
+            </a:r>
+            <a:r>
+              <a:rPr lang="en-US" altLang="zh-CN" dirty="0"/>
+              <a:t>(</a:t>
+            </a:r>
+            <a:r>
+              <a:rPr lang="en-US" altLang="zh-CN" dirty="0" err="1"/>
+              <a:t>activeActors</a:t>
+            </a:r>
+            <a:r>
+              <a:rPr lang="en-US" altLang="zh-CN" dirty="0"/>
+              <a:t>[</a:t>
+            </a:r>
+            <a:r>
+              <a:rPr lang="en-US" altLang="zh-CN" dirty="0" err="1"/>
+              <a:t>i</a:t>
+            </a:r>
+            <a:r>
+              <a:rPr lang="en-US" altLang="zh-CN" dirty="0"/>
+              <a:t>]-&gt;</a:t>
+            </a:r>
+            <a:r>
+              <a:rPr lang="en-US" altLang="zh-CN" dirty="0" err="1"/>
+              <a:t>getGlobalPose</a:t>
+            </a:r>
+            <a:r>
+              <a:rPr lang="en-US" altLang="zh-CN" dirty="0"/>
+              <a:t>());</a:t>
+            </a:r>
+          </a:p>
+          <a:p>
+            <a:r>
+              <a:rPr lang="en-US" altLang="zh-CN" dirty="0"/>
+              <a:t>}</a:t>
+            </a:r>
           </a:p>
         </p:txBody>
       </p:sp>
     </p:spTree>
     <p:extLst>
       <p:ext uri="{BB962C8B-B14F-4D97-AF65-F5344CB8AC3E}">
-        <p14:creationId xmlns:p14="http://schemas.microsoft.com/office/powerpoint/2010/main" val="2473295673"/>
+        <p14:creationId xmlns:p14="http://schemas.microsoft.com/office/powerpoint/2010/main" val="1529980378"/>
       </p:ext>
     </p:extLst>
   </p:cSld>

</xml_diff>